<commit_message>
Differentiation between sponsors and partners
</commit_message>
<xml_diff>
--- a/Speakers/Global-AI-Bootcamp-Valencia-2025.pptx
+++ b/Speakers/Global-AI-Bootcamp-Valencia-2025.pptx
@@ -14,7 +14,7 @@
     <p:sldId id="2147482238" r:id="rId7"/>
     <p:sldId id="2147482263" r:id="rId8"/>
     <p:sldId id="2147482262" r:id="rId9"/>
-    <p:sldId id="2147482264" r:id="rId10"/>
+    <p:sldId id="2147482265" r:id="rId10"/>
     <p:sldId id="2147482259" r:id="rId11"/>
   </p:sldIdLst>
   <p:sldSz cx="12192000" cy="6858000"/>
@@ -792,7 +792,7 @@
         <p:cNvPr id="1" name="">
           <a:extLst>
             <a:ext uri="{FF2B5EF4-FFF2-40B4-BE49-F238E27FC236}">
-              <a16:creationId xmlns:a16="http://schemas.microsoft.com/office/drawing/2014/main" id="{A54D0EC3-38E0-39D3-C385-CC129EB7616D}"/>
+              <a16:creationId xmlns:a16="http://schemas.microsoft.com/office/drawing/2014/main" id="{682554C5-EF59-8422-8045-36DB47E3918F}"/>
             </a:ext>
           </a:extLst>
         </p:cNvPr>
@@ -812,7 +812,7 @@
           <p:cNvPr id="2" name="Slide Image Placeholder 1">
             <a:extLst>
               <a:ext uri="{FF2B5EF4-FFF2-40B4-BE49-F238E27FC236}">
-                <a16:creationId xmlns:a16="http://schemas.microsoft.com/office/drawing/2014/main" id="{A8D75805-4BC9-A30F-C708-22EA7C61CFFB}"/>
+                <a16:creationId xmlns:a16="http://schemas.microsoft.com/office/drawing/2014/main" id="{4BC4ACBA-CB62-2A94-DAE9-8A6F040E1331}"/>
               </a:ext>
             </a:extLst>
           </p:cNvPr>
@@ -830,7 +830,7 @@
           <p:cNvPr id="3" name="Notes Placeholder 2">
             <a:extLst>
               <a:ext uri="{FF2B5EF4-FFF2-40B4-BE49-F238E27FC236}">
-                <a16:creationId xmlns:a16="http://schemas.microsoft.com/office/drawing/2014/main" id="{E8C3FE66-2627-0378-98B1-1D372775C8C8}"/>
+                <a16:creationId xmlns:a16="http://schemas.microsoft.com/office/drawing/2014/main" id="{25D3920B-8321-318C-EF4D-3EEBDFCF84F0}"/>
               </a:ext>
             </a:extLst>
           </p:cNvPr>
@@ -855,7 +855,7 @@
           <p:cNvPr id="4" name="Slide Number Placeholder 3">
             <a:extLst>
               <a:ext uri="{FF2B5EF4-FFF2-40B4-BE49-F238E27FC236}">
-                <a16:creationId xmlns:a16="http://schemas.microsoft.com/office/drawing/2014/main" id="{D737F997-B198-53EE-0FF2-6AE9F1F00A57}"/>
+                <a16:creationId xmlns:a16="http://schemas.microsoft.com/office/drawing/2014/main" id="{2DB87B15-C371-A5A9-8B9C-189717397620}"/>
               </a:ext>
             </a:extLst>
           </p:cNvPr>
@@ -942,7 +942,7 @@
     </p:spTree>
     <p:extLst>
       <p:ext uri="{BB962C8B-B14F-4D97-AF65-F5344CB8AC3E}">
-        <p14:creationId xmlns:p14="http://schemas.microsoft.com/office/powerpoint/2010/main" val="1819373355"/>
+        <p14:creationId xmlns:p14="http://schemas.microsoft.com/office/powerpoint/2010/main" val="2026119649"/>
       </p:ext>
     </p:extLst>
   </p:cSld>
@@ -1491,6 +1491,859 @@
 </file>
 
 <file path=ppt/slideLayouts/slideLayout4.xml><?xml version="1.0" encoding="utf-8"?>
+<p:sldLayout xmlns:a="http://schemas.openxmlformats.org/drawingml/2006/main" xmlns:r="http://schemas.openxmlformats.org/officeDocument/2006/relationships" xmlns:p="http://schemas.openxmlformats.org/presentationml/2006/main" userDrawn="1">
+  <p:cSld name="Patrocinadores">
+    <p:bg>
+      <p:bgPr>
+        <a:solidFill>
+          <a:srgbClr val="061F2C"/>
+        </a:solidFill>
+        <a:effectLst/>
+      </p:bgPr>
+    </p:bg>
+    <p:spTree>
+      <p:nvGrpSpPr>
+        <p:cNvPr id="1" name=""/>
+        <p:cNvGrpSpPr/>
+        <p:nvPr/>
+      </p:nvGrpSpPr>
+      <p:grpSpPr>
+        <a:xfrm>
+          <a:off x="0" y="0"/>
+          <a:ext cx="0" cy="0"/>
+          <a:chOff x="0" y="0"/>
+          <a:chExt cx="0" cy="0"/>
+        </a:xfrm>
+      </p:grpSpPr>
+      <p:sp>
+        <p:nvSpPr>
+          <p:cNvPr id="2" name="TextBox 7">
+            <a:extLst>
+              <a:ext uri="{FF2B5EF4-FFF2-40B4-BE49-F238E27FC236}">
+                <a16:creationId xmlns:a16="http://schemas.microsoft.com/office/drawing/2014/main" id="{B2249077-1C5B-AAF0-9401-4873FE65A68F}"/>
+              </a:ext>
+            </a:extLst>
+          </p:cNvPr>
+          <p:cNvSpPr txBox="1"/>
+          <p:nvPr userDrawn="1"/>
+        </p:nvSpPr>
+        <p:spPr>
+          <a:xfrm>
+            <a:off x="941806" y="524867"/>
+            <a:ext cx="5225314" cy="1446550"/>
+          </a:xfrm>
+          <a:prstGeom prst="rect">
+            <a:avLst/>
+          </a:prstGeom>
+          <a:noFill/>
+        </p:spPr>
+        <p:txBody>
+          <a:bodyPr wrap="square">
+            <a:spAutoFit/>
+          </a:bodyPr>
+          <a:lstStyle/>
+          <a:p>
+            <a:pPr marL="0" marR="0" lvl="0" indent="0" algn="l" defTabSz="914367" rtl="0" eaLnBrk="1" fontAlgn="auto" latinLnBrk="0" hangingPunct="1">
+              <a:lnSpc>
+                <a:spcPct val="100000"/>
+              </a:lnSpc>
+              <a:spcBef>
+                <a:spcPts val="0"/>
+              </a:spcBef>
+              <a:spcAft>
+                <a:spcPts val="0"/>
+              </a:spcAft>
+              <a:buClrTx/>
+              <a:buSzTx/>
+              <a:buFontTx/>
+              <a:buNone/>
+              <a:tabLst/>
+              <a:defRPr/>
+            </a:pPr>
+            <a:r>
+              <a:rPr kumimoji="0" lang="en-US" sz="4400" b="1" i="0" u="none" strike="noStrike" kern="1200" cap="none" spc="0" normalizeH="0" baseline="0" noProof="0" dirty="0">
+                <a:ln>
+                  <a:noFill/>
+                </a:ln>
+                <a:solidFill>
+                  <a:srgbClr val="8EE972"/>
+                </a:solidFill>
+                <a:effectLst/>
+                <a:uLnTx/>
+                <a:uFillTx/>
+                <a:latin typeface="Segoe UI" panose="020B0502040204020203" pitchFamily="34" charset="0"/>
+                <a:ea typeface="+mn-ea"/>
+                <a:cs typeface="Segoe UI" panose="020B0502040204020203" pitchFamily="34" charset="0"/>
+              </a:rPr>
+              <a:t>Gracias a </a:t>
+            </a:r>
+            <a:r>
+              <a:rPr kumimoji="0" lang="en-US" sz="4400" b="1" i="0" u="none" strike="noStrike" kern="1200" cap="none" spc="0" normalizeH="0" baseline="0" noProof="0" dirty="0" err="1">
+                <a:ln>
+                  <a:noFill/>
+                </a:ln>
+                <a:solidFill>
+                  <a:srgbClr val="8EE972"/>
+                </a:solidFill>
+                <a:effectLst/>
+                <a:uLnTx/>
+                <a:uFillTx/>
+                <a:latin typeface="Segoe UI" panose="020B0502040204020203" pitchFamily="34" charset="0"/>
+                <a:ea typeface="+mn-ea"/>
+                <a:cs typeface="Segoe UI" panose="020B0502040204020203" pitchFamily="34" charset="0"/>
+              </a:rPr>
+              <a:t>nuestros</a:t>
+            </a:r>
+            <a:r>
+              <a:rPr kumimoji="0" lang="en-US" sz="4400" b="1" i="0" u="none" strike="noStrike" kern="1200" cap="none" spc="0" normalizeH="0" baseline="0" noProof="0" dirty="0">
+                <a:ln>
+                  <a:noFill/>
+                </a:ln>
+                <a:solidFill>
+                  <a:srgbClr val="8EE972"/>
+                </a:solidFill>
+                <a:effectLst/>
+                <a:uLnTx/>
+                <a:uFillTx/>
+                <a:latin typeface="Segoe UI" panose="020B0502040204020203" pitchFamily="34" charset="0"/>
+                <a:ea typeface="+mn-ea"/>
+                <a:cs typeface="Segoe UI" panose="020B0502040204020203" pitchFamily="34" charset="0"/>
+              </a:rPr>
+              <a:t> </a:t>
+            </a:r>
+            <a:r>
+              <a:rPr kumimoji="0" lang="en-US" sz="4400" b="1" i="0" u="none" strike="noStrike" kern="1200" cap="none" spc="0" normalizeH="0" baseline="0" noProof="0" dirty="0" err="1">
+                <a:ln>
+                  <a:noFill/>
+                </a:ln>
+                <a:solidFill>
+                  <a:srgbClr val="8EE972"/>
+                </a:solidFill>
+                <a:effectLst/>
+                <a:uLnTx/>
+                <a:uFillTx/>
+                <a:latin typeface="Segoe UI" panose="020B0502040204020203" pitchFamily="34" charset="0"/>
+                <a:ea typeface="+mn-ea"/>
+                <a:cs typeface="Segoe UI" panose="020B0502040204020203" pitchFamily="34" charset="0"/>
+              </a:rPr>
+              <a:t>patrocinadores</a:t>
+            </a:r>
+            <a:r>
+              <a:rPr kumimoji="0" lang="en-US" sz="4400" b="1" i="0" u="none" strike="noStrike" kern="1200" cap="none" spc="0" normalizeH="0" baseline="0" noProof="0" dirty="0">
+                <a:ln>
+                  <a:noFill/>
+                </a:ln>
+                <a:solidFill>
+                  <a:srgbClr val="8EE972"/>
+                </a:solidFill>
+                <a:effectLst/>
+                <a:uLnTx/>
+                <a:uFillTx/>
+                <a:latin typeface="Segoe UI" panose="020B0502040204020203" pitchFamily="34" charset="0"/>
+                <a:ea typeface="+mn-ea"/>
+                <a:cs typeface="Segoe UI" panose="020B0502040204020203" pitchFamily="34" charset="0"/>
+              </a:rPr>
+              <a:t>:</a:t>
+            </a:r>
+          </a:p>
+        </p:txBody>
+      </p:sp>
+      <p:sp>
+        <p:nvSpPr>
+          <p:cNvPr id="3" name="Rectángulo: esquinas redondeadas 2">
+            <a:extLst>
+              <a:ext uri="{FF2B5EF4-FFF2-40B4-BE49-F238E27FC236}">
+                <a16:creationId xmlns:a16="http://schemas.microsoft.com/office/drawing/2014/main" id="{15BEB945-082C-BEBB-B13A-76D0FFE9F04E}"/>
+              </a:ext>
+            </a:extLst>
+          </p:cNvPr>
+          <p:cNvSpPr/>
+          <p:nvPr userDrawn="1"/>
+        </p:nvSpPr>
+        <p:spPr bwMode="auto">
+          <a:xfrm>
+            <a:off x="697832" y="2225307"/>
+            <a:ext cx="10792326" cy="2684150"/>
+          </a:xfrm>
+          <a:prstGeom prst="roundRect">
+            <a:avLst>
+              <a:gd name="adj" fmla="val 6794"/>
+            </a:avLst>
+          </a:prstGeom>
+          <a:solidFill>
+            <a:schemeClr val="bg1"/>
+          </a:solidFill>
+          <a:ln>
+            <a:noFill/>
+            <a:headEnd type="none" w="med" len="med"/>
+            <a:tailEnd type="none" w="med" len="med"/>
+          </a:ln>
+          <a:effectLst>
+            <a:outerShdw blurRad="50800" dist="38100" dir="5400000" sx="101000" sy="101000" algn="t" rotWithShape="0">
+              <a:prstClr val="black">
+                <a:alpha val="40000"/>
+              </a:prstClr>
+            </a:outerShdw>
+          </a:effectLst>
+        </p:spPr>
+        <p:style>
+          <a:lnRef idx="1">
+            <a:schemeClr val="accent2"/>
+          </a:lnRef>
+          <a:fillRef idx="3">
+            <a:schemeClr val="accent2"/>
+          </a:fillRef>
+          <a:effectRef idx="2">
+            <a:schemeClr val="accent2"/>
+          </a:effectRef>
+          <a:fontRef idx="minor">
+            <a:schemeClr val="lt1"/>
+          </a:fontRef>
+        </p:style>
+        <p:txBody>
+          <a:bodyPr rot="0" spcFirstLastPara="0" vertOverflow="overflow" horzOverflow="overflow" vert="horz" wrap="square" lIns="182880" tIns="146304" rIns="182880" bIns="146304" numCol="1" spcCol="0" rtlCol="0" fromWordArt="0" anchor="t" anchorCtr="0" forceAA="0" compatLnSpc="1">
+            <a:prstTxWarp prst="textNoShape">
+              <a:avLst/>
+            </a:prstTxWarp>
+            <a:noAutofit/>
+          </a:bodyPr>
+          <a:lstStyle/>
+          <a:p>
+            <a:pPr algn="l" defTabSz="932472" fontAlgn="base">
+              <a:spcBef>
+                <a:spcPct val="0"/>
+              </a:spcBef>
+              <a:spcAft>
+                <a:spcPct val="0"/>
+              </a:spcAft>
+            </a:pPr>
+            <a:endParaRPr lang="es-ES" sz="2000" dirty="0" err="1">
+              <a:gradFill>
+                <a:gsLst>
+                  <a:gs pos="0">
+                    <a:srgbClr val="FFFFFF"/>
+                  </a:gs>
+                  <a:gs pos="100000">
+                    <a:srgbClr val="FFFFFF"/>
+                  </a:gs>
+                </a:gsLst>
+                <a:lin ang="5400000" scaled="0"/>
+              </a:gradFill>
+              <a:ea typeface="Segoe UI" pitchFamily="34" charset="0"/>
+              <a:cs typeface="Segoe UI" pitchFamily="34" charset="0"/>
+            </a:endParaRPr>
+          </a:p>
+        </p:txBody>
+      </p:sp>
+      <p:pic>
+        <p:nvPicPr>
+          <p:cNvPr id="11" name="Picture 7" descr="A black background with white text&#10;&#10;Description automatically generated">
+            <a:extLst>
+              <a:ext uri="{FF2B5EF4-FFF2-40B4-BE49-F238E27FC236}">
+                <a16:creationId xmlns:a16="http://schemas.microsoft.com/office/drawing/2014/main" id="{7EC3FC85-B71B-2A1B-E663-35259D86C21D}"/>
+              </a:ext>
+            </a:extLst>
+          </p:cNvPr>
+          <p:cNvPicPr>
+            <a:picLocks noChangeAspect="1"/>
+          </p:cNvPicPr>
+          <p:nvPr userDrawn="1"/>
+        </p:nvPicPr>
+        <p:blipFill>
+          <a:blip r:embed="rId2"/>
+          <a:stretch>
+            <a:fillRect/>
+          </a:stretch>
+        </p:blipFill>
+        <p:spPr>
+          <a:xfrm>
+            <a:off x="7723271" y="813564"/>
+            <a:ext cx="2781300" cy="869156"/>
+          </a:xfrm>
+          <a:prstGeom prst="rect">
+            <a:avLst/>
+          </a:prstGeom>
+        </p:spPr>
+      </p:pic>
+      <p:pic>
+        <p:nvPicPr>
+          <p:cNvPr id="16" name="Imagen 15" descr="Una caricatura de una ciudad&#10;&#10;Descripción generada automáticamente con confianza media">
+            <a:extLst>
+              <a:ext uri="{FF2B5EF4-FFF2-40B4-BE49-F238E27FC236}">
+                <a16:creationId xmlns:a16="http://schemas.microsoft.com/office/drawing/2014/main" id="{1FF6DCBD-1CA8-51AE-8B61-A0E893737F43}"/>
+              </a:ext>
+            </a:extLst>
+          </p:cNvPr>
+          <p:cNvPicPr>
+            <a:picLocks noChangeAspect="1"/>
+          </p:cNvPicPr>
+          <p:nvPr userDrawn="1"/>
+        </p:nvPicPr>
+        <p:blipFill>
+          <a:blip r:embed="rId3"/>
+          <a:stretch>
+            <a:fillRect/>
+          </a:stretch>
+        </p:blipFill>
+        <p:spPr>
+          <a:xfrm>
+            <a:off x="10683124" y="598143"/>
+            <a:ext cx="1215189" cy="1215189"/>
+          </a:xfrm>
+          <a:prstGeom prst="rect">
+            <a:avLst/>
+          </a:prstGeom>
+        </p:spPr>
+      </p:pic>
+      <p:sp>
+        <p:nvSpPr>
+          <p:cNvPr id="4" name="Rectángulo: esquinas redondeadas 3">
+            <a:extLst>
+              <a:ext uri="{FF2B5EF4-FFF2-40B4-BE49-F238E27FC236}">
+                <a16:creationId xmlns:a16="http://schemas.microsoft.com/office/drawing/2014/main" id="{FF5B7331-9C25-8410-2E4B-F6140DDAFB09}"/>
+              </a:ext>
+            </a:extLst>
+          </p:cNvPr>
+          <p:cNvSpPr/>
+          <p:nvPr userDrawn="1"/>
+        </p:nvSpPr>
+        <p:spPr bwMode="auto">
+          <a:xfrm>
+            <a:off x="697832" y="5660571"/>
+            <a:ext cx="10792326" cy="1063716"/>
+          </a:xfrm>
+          <a:prstGeom prst="roundRect">
+            <a:avLst>
+              <a:gd name="adj" fmla="val 6794"/>
+            </a:avLst>
+          </a:prstGeom>
+          <a:solidFill>
+            <a:schemeClr val="bg1"/>
+          </a:solidFill>
+          <a:ln>
+            <a:noFill/>
+            <a:headEnd type="none" w="med" len="med"/>
+            <a:tailEnd type="none" w="med" len="med"/>
+          </a:ln>
+          <a:effectLst>
+            <a:outerShdw blurRad="50800" dist="38100" dir="5400000" sx="101000" sy="101000" algn="t" rotWithShape="0">
+              <a:prstClr val="black">
+                <a:alpha val="40000"/>
+              </a:prstClr>
+            </a:outerShdw>
+          </a:effectLst>
+        </p:spPr>
+        <p:style>
+          <a:lnRef idx="1">
+            <a:schemeClr val="accent2"/>
+          </a:lnRef>
+          <a:fillRef idx="3">
+            <a:schemeClr val="accent2"/>
+          </a:fillRef>
+          <a:effectRef idx="2">
+            <a:schemeClr val="accent2"/>
+          </a:effectRef>
+          <a:fontRef idx="minor">
+            <a:schemeClr val="lt1"/>
+          </a:fontRef>
+        </p:style>
+        <p:txBody>
+          <a:bodyPr rot="0" spcFirstLastPara="0" vertOverflow="overflow" horzOverflow="overflow" vert="horz" wrap="square" lIns="182880" tIns="146304" rIns="182880" bIns="146304" numCol="1" spcCol="0" rtlCol="0" fromWordArt="0" anchor="t" anchorCtr="0" forceAA="0" compatLnSpc="1">
+            <a:prstTxWarp prst="textNoShape">
+              <a:avLst/>
+            </a:prstTxWarp>
+            <a:noAutofit/>
+          </a:bodyPr>
+          <a:lstStyle/>
+          <a:p>
+            <a:pPr algn="l" defTabSz="932472" fontAlgn="base">
+              <a:spcBef>
+                <a:spcPct val="0"/>
+              </a:spcBef>
+              <a:spcAft>
+                <a:spcPct val="0"/>
+              </a:spcAft>
+            </a:pPr>
+            <a:endParaRPr lang="es-ES" sz="2000" dirty="0" err="1">
+              <a:gradFill>
+                <a:gsLst>
+                  <a:gs pos="0">
+                    <a:srgbClr val="FFFFFF"/>
+                  </a:gs>
+                  <a:gs pos="100000">
+                    <a:srgbClr val="FFFFFF"/>
+                  </a:gs>
+                </a:gsLst>
+                <a:lin ang="5400000" scaled="0"/>
+              </a:gradFill>
+              <a:ea typeface="Segoe UI" pitchFamily="34" charset="0"/>
+              <a:cs typeface="Segoe UI" pitchFamily="34" charset="0"/>
+            </a:endParaRPr>
+          </a:p>
+        </p:txBody>
+      </p:sp>
+      <p:sp>
+        <p:nvSpPr>
+          <p:cNvPr id="5" name="TextBox 7">
+            <a:extLst>
+              <a:ext uri="{FF2B5EF4-FFF2-40B4-BE49-F238E27FC236}">
+                <a16:creationId xmlns:a16="http://schemas.microsoft.com/office/drawing/2014/main" id="{488E22AA-CA58-0BBF-21BA-63164A52BC5D}"/>
+              </a:ext>
+            </a:extLst>
+          </p:cNvPr>
+          <p:cNvSpPr txBox="1"/>
+          <p:nvPr userDrawn="1"/>
+        </p:nvSpPr>
+        <p:spPr>
+          <a:xfrm>
+            <a:off x="941806" y="4891130"/>
+            <a:ext cx="10808510" cy="646331"/>
+          </a:xfrm>
+          <a:prstGeom prst="rect">
+            <a:avLst/>
+          </a:prstGeom>
+          <a:noFill/>
+        </p:spPr>
+        <p:txBody>
+          <a:bodyPr wrap="square">
+            <a:spAutoFit/>
+          </a:bodyPr>
+          <a:lstStyle/>
+          <a:p>
+            <a:pPr marL="0" marR="0" lvl="0" indent="0" algn="l" defTabSz="914367" rtl="0" eaLnBrk="1" fontAlgn="auto" latinLnBrk="0" hangingPunct="1">
+              <a:lnSpc>
+                <a:spcPct val="100000"/>
+              </a:lnSpc>
+              <a:spcBef>
+                <a:spcPts val="0"/>
+              </a:spcBef>
+              <a:spcAft>
+                <a:spcPts val="0"/>
+              </a:spcAft>
+              <a:buClrTx/>
+              <a:buSzTx/>
+              <a:buFontTx/>
+              <a:buNone/>
+              <a:tabLst/>
+              <a:defRPr/>
+            </a:pPr>
+            <a:r>
+              <a:rPr kumimoji="0" lang="en-US" sz="3600" b="1" i="0" u="none" strike="noStrike" kern="1200" cap="none" spc="0" normalizeH="0" baseline="0" noProof="0" dirty="0">
+                <a:ln>
+                  <a:noFill/>
+                </a:ln>
+                <a:solidFill>
+                  <a:srgbClr val="8EE972"/>
+                </a:solidFill>
+                <a:effectLst/>
+                <a:uLnTx/>
+                <a:uFillTx/>
+                <a:latin typeface="Segoe UI" panose="020B0502040204020203" pitchFamily="34" charset="0"/>
+                <a:ea typeface="+mn-ea"/>
+                <a:cs typeface="Segoe UI" panose="020B0502040204020203" pitchFamily="34" charset="0"/>
+              </a:rPr>
+              <a:t>y a </a:t>
+            </a:r>
+            <a:r>
+              <a:rPr kumimoji="0" lang="en-US" sz="3600" b="1" i="0" u="none" strike="noStrike" kern="1200" cap="none" spc="0" normalizeH="0" baseline="0" noProof="0" dirty="0" err="1">
+                <a:ln>
+                  <a:noFill/>
+                </a:ln>
+                <a:solidFill>
+                  <a:srgbClr val="8EE972"/>
+                </a:solidFill>
+                <a:effectLst/>
+                <a:uLnTx/>
+                <a:uFillTx/>
+                <a:latin typeface="Segoe UI" panose="020B0502040204020203" pitchFamily="34" charset="0"/>
+                <a:ea typeface="+mn-ea"/>
+                <a:cs typeface="Segoe UI" panose="020B0502040204020203" pitchFamily="34" charset="0"/>
+              </a:rPr>
+              <a:t>nuestros</a:t>
+            </a:r>
+            <a:r>
+              <a:rPr kumimoji="0" lang="en-US" sz="3600" b="1" i="0" u="none" strike="noStrike" kern="1200" cap="none" spc="0" normalizeH="0" baseline="0" noProof="0" dirty="0">
+                <a:ln>
+                  <a:noFill/>
+                </a:ln>
+                <a:solidFill>
+                  <a:srgbClr val="8EE972"/>
+                </a:solidFill>
+                <a:effectLst/>
+                <a:uLnTx/>
+                <a:uFillTx/>
+                <a:latin typeface="Segoe UI" panose="020B0502040204020203" pitchFamily="34" charset="0"/>
+                <a:ea typeface="+mn-ea"/>
+                <a:cs typeface="Segoe UI" panose="020B0502040204020203" pitchFamily="34" charset="0"/>
+              </a:rPr>
+              <a:t> </a:t>
+            </a:r>
+            <a:r>
+              <a:rPr kumimoji="0" lang="en-US" sz="3600" b="1" i="0" u="none" strike="noStrike" kern="1200" cap="none" spc="0" normalizeH="0" baseline="0" noProof="0" dirty="0" err="1">
+                <a:ln>
+                  <a:noFill/>
+                </a:ln>
+                <a:solidFill>
+                  <a:srgbClr val="8EE972"/>
+                </a:solidFill>
+                <a:effectLst/>
+                <a:uLnTx/>
+                <a:uFillTx/>
+                <a:latin typeface="Segoe UI" panose="020B0502040204020203" pitchFamily="34" charset="0"/>
+                <a:ea typeface="+mn-ea"/>
+                <a:cs typeface="Segoe UI" panose="020B0502040204020203" pitchFamily="34" charset="0"/>
+              </a:rPr>
+              <a:t>colaboradores</a:t>
+            </a:r>
+            <a:r>
+              <a:rPr kumimoji="0" lang="en-US" sz="3600" b="1" i="0" u="none" strike="noStrike" kern="1200" cap="none" spc="0" normalizeH="0" baseline="0" noProof="0" dirty="0">
+                <a:ln>
+                  <a:noFill/>
+                </a:ln>
+                <a:solidFill>
+                  <a:srgbClr val="8EE972"/>
+                </a:solidFill>
+                <a:effectLst/>
+                <a:uLnTx/>
+                <a:uFillTx/>
+                <a:latin typeface="Segoe UI" panose="020B0502040204020203" pitchFamily="34" charset="0"/>
+                <a:ea typeface="+mn-ea"/>
+                <a:cs typeface="Segoe UI" panose="020B0502040204020203" pitchFamily="34" charset="0"/>
+              </a:rPr>
+              <a:t>:</a:t>
+            </a:r>
+          </a:p>
+        </p:txBody>
+      </p:sp>
+      <p:pic>
+        <p:nvPicPr>
+          <p:cNvPr id="10" name="Gráfico 9">
+            <a:extLst>
+              <a:ext uri="{FF2B5EF4-FFF2-40B4-BE49-F238E27FC236}">
+                <a16:creationId xmlns:a16="http://schemas.microsoft.com/office/drawing/2014/main" id="{13B62FA7-B038-93AF-E1D7-A562B2BCAF28}"/>
+              </a:ext>
+            </a:extLst>
+          </p:cNvPr>
+          <p:cNvPicPr>
+            <a:picLocks noChangeAspect="1"/>
+          </p:cNvPicPr>
+          <p:nvPr userDrawn="1"/>
+        </p:nvPicPr>
+        <p:blipFill>
+          <a:blip r:embed="rId4">
+            <a:extLst>
+              <a:ext uri="{96DAC541-7B7A-43D3-8B79-37D633B846F1}">
+                <asvg:svgBlip xmlns:asvg="http://schemas.microsoft.com/office/drawing/2016/SVG/main" r:embed="rId5"/>
+              </a:ext>
+            </a:extLst>
+          </a:blip>
+          <a:stretch>
+            <a:fillRect/>
+          </a:stretch>
+        </p:blipFill>
+        <p:spPr>
+          <a:xfrm>
+            <a:off x="1647192" y="5826949"/>
+            <a:ext cx="3219450" cy="685800"/>
+          </a:xfrm>
+          <a:prstGeom prst="rect">
+            <a:avLst/>
+          </a:prstGeom>
+        </p:spPr>
+      </p:pic>
+      <p:pic>
+        <p:nvPicPr>
+          <p:cNvPr id="6" name="Gráfico 5">
+            <a:extLst>
+              <a:ext uri="{FF2B5EF4-FFF2-40B4-BE49-F238E27FC236}">
+                <a16:creationId xmlns:a16="http://schemas.microsoft.com/office/drawing/2014/main" id="{6E48658D-3890-6E69-2E42-C24A0A2D8D8E}"/>
+              </a:ext>
+            </a:extLst>
+          </p:cNvPr>
+          <p:cNvPicPr>
+            <a:picLocks noChangeAspect="1"/>
+          </p:cNvPicPr>
+          <p:nvPr userDrawn="1"/>
+        </p:nvPicPr>
+        <p:blipFill>
+          <a:blip r:embed="rId6">
+            <a:extLst>
+              <a:ext uri="{96DAC541-7B7A-43D3-8B79-37D633B846F1}">
+                <asvg:svgBlip xmlns:asvg="http://schemas.microsoft.com/office/drawing/2016/SVG/main" r:embed="rId7"/>
+              </a:ext>
+            </a:extLst>
+          </a:blip>
+          <a:stretch>
+            <a:fillRect/>
+          </a:stretch>
+        </p:blipFill>
+        <p:spPr>
+          <a:xfrm>
+            <a:off x="7185481" y="5545601"/>
+            <a:ext cx="3745491" cy="1248497"/>
+          </a:xfrm>
+          <a:prstGeom prst="rect">
+            <a:avLst/>
+          </a:prstGeom>
+        </p:spPr>
+      </p:pic>
+    </p:spTree>
+    <p:extLst>
+      <p:ext uri="{BB962C8B-B14F-4D97-AF65-F5344CB8AC3E}">
+        <p14:creationId xmlns:p14="http://schemas.microsoft.com/office/powerpoint/2010/main" val="1723712904"/>
+      </p:ext>
+    </p:extLst>
+  </p:cSld>
+  <p:clrMapOvr>
+    <a:overrideClrMapping bg1="lt1" tx1="dk1" bg2="lt2" tx2="dk2" accent1="accent1" accent2="accent2" accent3="accent3" accent4="accent4" accent5="accent5" accent6="accent6" hlink="hlink" folHlink="folHlink"/>
+  </p:clrMapOvr>
+  <mc:AlternateContent xmlns:mc="http://schemas.openxmlformats.org/markup-compatibility/2006" xmlns:p14="http://schemas.microsoft.com/office/powerpoint/2010/main">
+    <mc:Choice Requires="p14">
+      <p:transition spd="med" p14:dur="700">
+        <p:fade/>
+      </p:transition>
+    </mc:Choice>
+    <mc:Fallback xmlns="">
+      <p:transition spd="med">
+        <p:fade/>
+      </p:transition>
+    </mc:Fallback>
+  </mc:AlternateContent>
+  <p:timing>
+    <p:tnLst>
+      <p:par>
+        <p:cTn id="1" dur="indefinite" restart="never" nodeType="tmRoot">
+          <p:childTnLst>
+            <p:seq concurrent="1" nextAc="seek">
+              <p:cTn id="2" dur="indefinite" nodeType="mainSeq">
+                <p:childTnLst>
+                  <p:par>
+                    <p:cTn id="3" fill="hold">
+                      <p:stCondLst>
+                        <p:cond delay="indefinite"/>
+                        <p:cond evt="onBegin" delay="0">
+                          <p:tn val="2"/>
+                        </p:cond>
+                      </p:stCondLst>
+                      <p:childTnLst>
+                        <p:par>
+                          <p:cTn id="4" fill="hold">
+                            <p:stCondLst>
+                              <p:cond delay="0"/>
+                            </p:stCondLst>
+                            <p:childTnLst>
+                              <p:par>
+                                <p:cTn id="5" presetID="2" presetClass="entr" presetSubtype="4" fill="hold" grpId="0" nodeType="afterEffect">
+                                  <p:stCondLst>
+                                    <p:cond delay="0"/>
+                                  </p:stCondLst>
+                                  <p:childTnLst>
+                                    <p:set>
+                                      <p:cBhvr>
+                                        <p:cTn id="6" dur="1" fill="hold">
+                                          <p:stCondLst>
+                                            <p:cond delay="0"/>
+                                          </p:stCondLst>
+                                        </p:cTn>
+                                        <p:tgtEl>
+                                          <p:spTgt spid="3"/>
+                                        </p:tgtEl>
+                                        <p:attrNameLst>
+                                          <p:attrName>style.visibility</p:attrName>
+                                        </p:attrNameLst>
+                                      </p:cBhvr>
+                                      <p:to>
+                                        <p:strVal val="visible"/>
+                                      </p:to>
+                                    </p:set>
+                                    <p:anim calcmode="lin" valueType="num">
+                                      <p:cBhvr additive="base">
+                                        <p:cTn id="7" dur="500" fill="hold"/>
+                                        <p:tgtEl>
+                                          <p:spTgt spid="3"/>
+                                        </p:tgtEl>
+                                        <p:attrNameLst>
+                                          <p:attrName>ppt_x</p:attrName>
+                                        </p:attrNameLst>
+                                      </p:cBhvr>
+                                      <p:tavLst>
+                                        <p:tav tm="0">
+                                          <p:val>
+                                            <p:strVal val="#ppt_x"/>
+                                          </p:val>
+                                        </p:tav>
+                                        <p:tav tm="100000">
+                                          <p:val>
+                                            <p:strVal val="#ppt_x"/>
+                                          </p:val>
+                                        </p:tav>
+                                      </p:tavLst>
+                                    </p:anim>
+                                    <p:anim calcmode="lin" valueType="num">
+                                      <p:cBhvr additive="base">
+                                        <p:cTn id="8" dur="500" fill="hold"/>
+                                        <p:tgtEl>
+                                          <p:spTgt spid="3"/>
+                                        </p:tgtEl>
+                                        <p:attrNameLst>
+                                          <p:attrName>ppt_y</p:attrName>
+                                        </p:attrNameLst>
+                                      </p:cBhvr>
+                                      <p:tavLst>
+                                        <p:tav tm="0">
+                                          <p:val>
+                                            <p:strVal val="1+#ppt_h/2"/>
+                                          </p:val>
+                                        </p:tav>
+                                        <p:tav tm="100000">
+                                          <p:val>
+                                            <p:strVal val="#ppt_y"/>
+                                          </p:val>
+                                        </p:tav>
+                                      </p:tavLst>
+                                    </p:anim>
+                                  </p:childTnLst>
+                                </p:cTn>
+                              </p:par>
+                            </p:childTnLst>
+                          </p:cTn>
+                        </p:par>
+                        <p:par>
+                          <p:cTn id="9" fill="hold">
+                            <p:stCondLst>
+                              <p:cond delay="500"/>
+                            </p:stCondLst>
+                            <p:childTnLst>
+                              <p:par>
+                                <p:cTn id="10" presetID="2" presetClass="entr" presetSubtype="4" fill="hold" grpId="0" nodeType="afterEffect">
+                                  <p:stCondLst>
+                                    <p:cond delay="0"/>
+                                  </p:stCondLst>
+                                  <p:childTnLst>
+                                    <p:set>
+                                      <p:cBhvr>
+                                        <p:cTn id="11" dur="1" fill="hold">
+                                          <p:stCondLst>
+                                            <p:cond delay="0"/>
+                                          </p:stCondLst>
+                                        </p:cTn>
+                                        <p:tgtEl>
+                                          <p:spTgt spid="4"/>
+                                        </p:tgtEl>
+                                        <p:attrNameLst>
+                                          <p:attrName>style.visibility</p:attrName>
+                                        </p:attrNameLst>
+                                      </p:cBhvr>
+                                      <p:to>
+                                        <p:strVal val="visible"/>
+                                      </p:to>
+                                    </p:set>
+                                    <p:anim calcmode="lin" valueType="num">
+                                      <p:cBhvr additive="base">
+                                        <p:cTn id="12" dur="500" fill="hold"/>
+                                        <p:tgtEl>
+                                          <p:spTgt spid="4"/>
+                                        </p:tgtEl>
+                                        <p:attrNameLst>
+                                          <p:attrName>ppt_x</p:attrName>
+                                        </p:attrNameLst>
+                                      </p:cBhvr>
+                                      <p:tavLst>
+                                        <p:tav tm="0">
+                                          <p:val>
+                                            <p:strVal val="#ppt_x"/>
+                                          </p:val>
+                                        </p:tav>
+                                        <p:tav tm="100000">
+                                          <p:val>
+                                            <p:strVal val="#ppt_x"/>
+                                          </p:val>
+                                        </p:tav>
+                                      </p:tavLst>
+                                    </p:anim>
+                                    <p:anim calcmode="lin" valueType="num">
+                                      <p:cBhvr additive="base">
+                                        <p:cTn id="13" dur="500" fill="hold"/>
+                                        <p:tgtEl>
+                                          <p:spTgt spid="4"/>
+                                        </p:tgtEl>
+                                        <p:attrNameLst>
+                                          <p:attrName>ppt_y</p:attrName>
+                                        </p:attrNameLst>
+                                      </p:cBhvr>
+                                      <p:tavLst>
+                                        <p:tav tm="0">
+                                          <p:val>
+                                            <p:strVal val="1+#ppt_h/2"/>
+                                          </p:val>
+                                        </p:tav>
+                                        <p:tav tm="100000">
+                                          <p:val>
+                                            <p:strVal val="#ppt_y"/>
+                                          </p:val>
+                                        </p:tav>
+                                      </p:tavLst>
+                                    </p:anim>
+                                  </p:childTnLst>
+                                </p:cTn>
+                              </p:par>
+                            </p:childTnLst>
+                          </p:cTn>
+                        </p:par>
+                      </p:childTnLst>
+                    </p:cTn>
+                  </p:par>
+                </p:childTnLst>
+              </p:cTn>
+              <p:prevCondLst>
+                <p:cond evt="onPrev" delay="0">
+                  <p:tgtEl>
+                    <p:sldTgt/>
+                  </p:tgtEl>
+                </p:cond>
+              </p:prevCondLst>
+              <p:nextCondLst>
+                <p:cond evt="onNext" delay="0">
+                  <p:tgtEl>
+                    <p:sldTgt/>
+                  </p:tgtEl>
+                </p:cond>
+              </p:nextCondLst>
+            </p:seq>
+          </p:childTnLst>
+        </p:cTn>
+      </p:par>
+    </p:tnLst>
+    <p:bldLst>
+      <p:bldP spid="3" grpId="0" animBg="1"/>
+      <p:bldP spid="4" grpId="0" animBg="1"/>
+    </p:bldLst>
+  </p:timing>
+  <p:extLst>
+    <p:ext uri="{DCECCB84-F9BA-43D5-87BE-67443E8EF086}">
+      <p15:sldGuideLst xmlns:p15="http://schemas.microsoft.com/office/powerpoint/2012/main">
+        <p15:guide id="1" orient="horz" pos="2228">
+          <p15:clr>
+            <a:srgbClr val="5ACBF0"/>
+          </p15:clr>
+        </p15:guide>
+        <p15:guide id="2" orient="horz" pos="2496">
+          <p15:clr>
+            <a:srgbClr val="5ACBF0"/>
+          </p15:clr>
+        </p15:guide>
+        <p15:guide id="4" orient="horz" pos="2160">
+          <p15:clr>
+            <a:srgbClr val="FBAE40"/>
+          </p15:clr>
+        </p15:guide>
+      </p15:sldGuideLst>
+    </p:ext>
+  </p:extLst>
+</p:sldLayout>
+</file>
+
+<file path=ppt/slideLayouts/slideLayout5.xml><?xml version="1.0" encoding="utf-8"?>
 <p:sldLayout xmlns:a="http://schemas.openxmlformats.org/drawingml/2006/main" xmlns:r="http://schemas.openxmlformats.org/officeDocument/2006/relationships" xmlns:p="http://schemas.openxmlformats.org/presentationml/2006/main" preserve="1" userDrawn="1">
   <p:cSld name="Portada">
     <p:bg>
@@ -1686,7 +2539,7 @@
 </p:sldLayout>
 </file>
 
-<file path=ppt/slideLayouts/slideLayout5.xml><?xml version="1.0" encoding="utf-8"?>
+<file path=ppt/slideLayouts/slideLayout6.xml><?xml version="1.0" encoding="utf-8"?>
 <p:sldLayout xmlns:a="http://schemas.openxmlformats.org/drawingml/2006/main" xmlns:r="http://schemas.openxmlformats.org/officeDocument/2006/relationships" xmlns:p="http://schemas.openxmlformats.org/presentationml/2006/main" preserve="1" userDrawn="1">
   <p:cSld name="Patrocinadores">
     <p:bg>
@@ -1824,20 +2677,23 @@
               </a:rPr>
               <a:t>patrocinadores</a:t>
             </a:r>
-            <a:endParaRPr kumimoji="0" lang="en-US" sz="4400" b="1" i="0" u="none" strike="noStrike" kern="1200" cap="none" spc="0" normalizeH="0" baseline="0" noProof="0" dirty="0">
-              <a:ln>
-                <a:noFill/>
-              </a:ln>
-              <a:solidFill>
-                <a:srgbClr val="8EE972"/>
-              </a:solidFill>
-              <a:effectLst/>
-              <a:uLnTx/>
-              <a:uFillTx/>
-              <a:latin typeface="Segoe UI" panose="020B0502040204020203" pitchFamily="34" charset="0"/>
-              <a:ea typeface="+mn-ea"/>
-              <a:cs typeface="Segoe UI" panose="020B0502040204020203" pitchFamily="34" charset="0"/>
-            </a:endParaRPr>
+            <a:r>
+              <a:rPr kumimoji="0" lang="en-US" sz="4400" b="1" i="0" u="none" strike="noStrike" kern="1200" cap="none" spc="0" normalizeH="0" baseline="0" noProof="0" dirty="0">
+                <a:ln>
+                  <a:noFill/>
+                </a:ln>
+                <a:solidFill>
+                  <a:srgbClr val="8EE972"/>
+                </a:solidFill>
+                <a:effectLst/>
+                <a:uLnTx/>
+                <a:uFillTx/>
+                <a:latin typeface="Segoe UI" panose="020B0502040204020203" pitchFamily="34" charset="0"/>
+                <a:ea typeface="+mn-ea"/>
+                <a:cs typeface="Segoe UI" panose="020B0502040204020203" pitchFamily="34" charset="0"/>
+              </a:rPr>
+              <a:t>:</a:t>
+            </a:r>
           </a:p>
         </p:txBody>
       </p:sp>
@@ -1855,8 +2711,8 @@
         </p:nvSpPr>
         <p:spPr bwMode="auto">
           <a:xfrm>
-            <a:off x="697832" y="2628079"/>
-            <a:ext cx="10792326" cy="3936234"/>
+            <a:off x="697832" y="2225307"/>
+            <a:ext cx="10792326" cy="2684150"/>
           </a:xfrm>
           <a:prstGeom prst="roundRect">
             <a:avLst>
@@ -1988,6 +2844,298 @@
           </a:prstGeom>
         </p:spPr>
       </p:pic>
+      <p:sp>
+        <p:nvSpPr>
+          <p:cNvPr id="4" name="Rectángulo: esquinas redondeadas 3">
+            <a:extLst>
+              <a:ext uri="{FF2B5EF4-FFF2-40B4-BE49-F238E27FC236}">
+                <a16:creationId xmlns:a16="http://schemas.microsoft.com/office/drawing/2014/main" id="{FF5B7331-9C25-8410-2E4B-F6140DDAFB09}"/>
+              </a:ext>
+            </a:extLst>
+          </p:cNvPr>
+          <p:cNvSpPr/>
+          <p:nvPr userDrawn="1"/>
+        </p:nvSpPr>
+        <p:spPr bwMode="auto">
+          <a:xfrm>
+            <a:off x="697832" y="5660571"/>
+            <a:ext cx="10792326" cy="1063716"/>
+          </a:xfrm>
+          <a:prstGeom prst="roundRect">
+            <a:avLst>
+              <a:gd name="adj" fmla="val 6794"/>
+            </a:avLst>
+          </a:prstGeom>
+          <a:solidFill>
+            <a:schemeClr val="bg1"/>
+          </a:solidFill>
+          <a:ln>
+            <a:noFill/>
+            <a:headEnd type="none" w="med" len="med"/>
+            <a:tailEnd type="none" w="med" len="med"/>
+          </a:ln>
+          <a:effectLst>
+            <a:outerShdw blurRad="50800" dist="38100" dir="5400000" sx="101000" sy="101000" algn="t" rotWithShape="0">
+              <a:prstClr val="black">
+                <a:alpha val="40000"/>
+              </a:prstClr>
+            </a:outerShdw>
+          </a:effectLst>
+        </p:spPr>
+        <p:style>
+          <a:lnRef idx="1">
+            <a:schemeClr val="accent2"/>
+          </a:lnRef>
+          <a:fillRef idx="3">
+            <a:schemeClr val="accent2"/>
+          </a:fillRef>
+          <a:effectRef idx="2">
+            <a:schemeClr val="accent2"/>
+          </a:effectRef>
+          <a:fontRef idx="minor">
+            <a:schemeClr val="lt1"/>
+          </a:fontRef>
+        </p:style>
+        <p:txBody>
+          <a:bodyPr rot="0" spcFirstLastPara="0" vertOverflow="overflow" horzOverflow="overflow" vert="horz" wrap="square" lIns="182880" tIns="146304" rIns="182880" bIns="146304" numCol="1" spcCol="0" rtlCol="0" fromWordArt="0" anchor="t" anchorCtr="0" forceAA="0" compatLnSpc="1">
+            <a:prstTxWarp prst="textNoShape">
+              <a:avLst/>
+            </a:prstTxWarp>
+            <a:noAutofit/>
+          </a:bodyPr>
+          <a:lstStyle/>
+          <a:p>
+            <a:pPr algn="l" defTabSz="932472" fontAlgn="base">
+              <a:spcBef>
+                <a:spcPct val="0"/>
+              </a:spcBef>
+              <a:spcAft>
+                <a:spcPct val="0"/>
+              </a:spcAft>
+            </a:pPr>
+            <a:endParaRPr lang="es-ES" sz="2000" dirty="0" err="1">
+              <a:gradFill>
+                <a:gsLst>
+                  <a:gs pos="0">
+                    <a:srgbClr val="FFFFFF"/>
+                  </a:gs>
+                  <a:gs pos="100000">
+                    <a:srgbClr val="FFFFFF"/>
+                  </a:gs>
+                </a:gsLst>
+                <a:lin ang="5400000" scaled="0"/>
+              </a:gradFill>
+              <a:ea typeface="Segoe UI" pitchFamily="34" charset="0"/>
+              <a:cs typeface="Segoe UI" pitchFamily="34" charset="0"/>
+            </a:endParaRPr>
+          </a:p>
+        </p:txBody>
+      </p:sp>
+      <p:sp>
+        <p:nvSpPr>
+          <p:cNvPr id="5" name="TextBox 7">
+            <a:extLst>
+              <a:ext uri="{FF2B5EF4-FFF2-40B4-BE49-F238E27FC236}">
+                <a16:creationId xmlns:a16="http://schemas.microsoft.com/office/drawing/2014/main" id="{488E22AA-CA58-0BBF-21BA-63164A52BC5D}"/>
+              </a:ext>
+            </a:extLst>
+          </p:cNvPr>
+          <p:cNvSpPr txBox="1"/>
+          <p:nvPr userDrawn="1"/>
+        </p:nvSpPr>
+        <p:spPr>
+          <a:xfrm>
+            <a:off x="941806" y="4891130"/>
+            <a:ext cx="10808510" cy="646331"/>
+          </a:xfrm>
+          <a:prstGeom prst="rect">
+            <a:avLst/>
+          </a:prstGeom>
+          <a:noFill/>
+        </p:spPr>
+        <p:txBody>
+          <a:bodyPr wrap="square">
+            <a:spAutoFit/>
+          </a:bodyPr>
+          <a:lstStyle/>
+          <a:p>
+            <a:pPr marL="0" marR="0" lvl="0" indent="0" algn="l" defTabSz="914367" rtl="0" eaLnBrk="1" fontAlgn="auto" latinLnBrk="0" hangingPunct="1">
+              <a:lnSpc>
+                <a:spcPct val="100000"/>
+              </a:lnSpc>
+              <a:spcBef>
+                <a:spcPts val="0"/>
+              </a:spcBef>
+              <a:spcAft>
+                <a:spcPts val="0"/>
+              </a:spcAft>
+              <a:buClrTx/>
+              <a:buSzTx/>
+              <a:buFontTx/>
+              <a:buNone/>
+              <a:tabLst/>
+              <a:defRPr/>
+            </a:pPr>
+            <a:r>
+              <a:rPr kumimoji="0" lang="en-US" sz="3600" b="1" i="0" u="none" strike="noStrike" kern="1200" cap="none" spc="0" normalizeH="0" baseline="0" noProof="0" dirty="0">
+                <a:ln>
+                  <a:noFill/>
+                </a:ln>
+                <a:solidFill>
+                  <a:srgbClr val="8EE972"/>
+                </a:solidFill>
+                <a:effectLst/>
+                <a:uLnTx/>
+                <a:uFillTx/>
+                <a:latin typeface="Segoe UI" panose="020B0502040204020203" pitchFamily="34" charset="0"/>
+                <a:ea typeface="+mn-ea"/>
+                <a:cs typeface="Segoe UI" panose="020B0502040204020203" pitchFamily="34" charset="0"/>
+              </a:rPr>
+              <a:t>y a </a:t>
+            </a:r>
+            <a:r>
+              <a:rPr kumimoji="0" lang="en-US" sz="3600" b="1" i="0" u="none" strike="noStrike" kern="1200" cap="none" spc="0" normalizeH="0" baseline="0" noProof="0" dirty="0" err="1">
+                <a:ln>
+                  <a:noFill/>
+                </a:ln>
+                <a:solidFill>
+                  <a:srgbClr val="8EE972"/>
+                </a:solidFill>
+                <a:effectLst/>
+                <a:uLnTx/>
+                <a:uFillTx/>
+                <a:latin typeface="Segoe UI" panose="020B0502040204020203" pitchFamily="34" charset="0"/>
+                <a:ea typeface="+mn-ea"/>
+                <a:cs typeface="Segoe UI" panose="020B0502040204020203" pitchFamily="34" charset="0"/>
+              </a:rPr>
+              <a:t>nuestros</a:t>
+            </a:r>
+            <a:r>
+              <a:rPr kumimoji="0" lang="en-US" sz="3600" b="1" i="0" u="none" strike="noStrike" kern="1200" cap="none" spc="0" normalizeH="0" baseline="0" noProof="0" dirty="0">
+                <a:ln>
+                  <a:noFill/>
+                </a:ln>
+                <a:solidFill>
+                  <a:srgbClr val="8EE972"/>
+                </a:solidFill>
+                <a:effectLst/>
+                <a:uLnTx/>
+                <a:uFillTx/>
+                <a:latin typeface="Segoe UI" panose="020B0502040204020203" pitchFamily="34" charset="0"/>
+                <a:ea typeface="+mn-ea"/>
+                <a:cs typeface="Segoe UI" panose="020B0502040204020203" pitchFamily="34" charset="0"/>
+              </a:rPr>
+              <a:t> </a:t>
+            </a:r>
+            <a:r>
+              <a:rPr kumimoji="0" lang="en-US" sz="3600" b="1" i="0" u="none" strike="noStrike" kern="1200" cap="none" spc="0" normalizeH="0" baseline="0" noProof="0" dirty="0" err="1">
+                <a:ln>
+                  <a:noFill/>
+                </a:ln>
+                <a:solidFill>
+                  <a:srgbClr val="8EE972"/>
+                </a:solidFill>
+                <a:effectLst/>
+                <a:uLnTx/>
+                <a:uFillTx/>
+                <a:latin typeface="Segoe UI" panose="020B0502040204020203" pitchFamily="34" charset="0"/>
+                <a:ea typeface="+mn-ea"/>
+                <a:cs typeface="Segoe UI" panose="020B0502040204020203" pitchFamily="34" charset="0"/>
+              </a:rPr>
+              <a:t>colaboradores</a:t>
+            </a:r>
+            <a:r>
+              <a:rPr kumimoji="0" lang="en-US" sz="3600" b="1" i="0" u="none" strike="noStrike" kern="1200" cap="none" spc="0" normalizeH="0" baseline="0" noProof="0" dirty="0">
+                <a:ln>
+                  <a:noFill/>
+                </a:ln>
+                <a:solidFill>
+                  <a:srgbClr val="8EE972"/>
+                </a:solidFill>
+                <a:effectLst/>
+                <a:uLnTx/>
+                <a:uFillTx/>
+                <a:latin typeface="Segoe UI" panose="020B0502040204020203" pitchFamily="34" charset="0"/>
+                <a:ea typeface="+mn-ea"/>
+                <a:cs typeface="Segoe UI" panose="020B0502040204020203" pitchFamily="34" charset="0"/>
+              </a:rPr>
+              <a:t>:</a:t>
+            </a:r>
+          </a:p>
+        </p:txBody>
+      </p:sp>
+      <p:pic>
+        <p:nvPicPr>
+          <p:cNvPr id="10" name="Gráfico 9">
+            <a:extLst>
+              <a:ext uri="{FF2B5EF4-FFF2-40B4-BE49-F238E27FC236}">
+                <a16:creationId xmlns:a16="http://schemas.microsoft.com/office/drawing/2014/main" id="{13B62FA7-B038-93AF-E1D7-A562B2BCAF28}"/>
+              </a:ext>
+            </a:extLst>
+          </p:cNvPr>
+          <p:cNvPicPr>
+            <a:picLocks noChangeAspect="1"/>
+          </p:cNvPicPr>
+          <p:nvPr userDrawn="1"/>
+        </p:nvPicPr>
+        <p:blipFill>
+          <a:blip r:embed="rId4">
+            <a:extLst>
+              <a:ext uri="{96DAC541-7B7A-43D3-8B79-37D633B846F1}">
+                <asvg:svgBlip xmlns:asvg="http://schemas.microsoft.com/office/drawing/2016/SVG/main" r:embed="rId5"/>
+              </a:ext>
+            </a:extLst>
+          </a:blip>
+          <a:stretch>
+            <a:fillRect/>
+          </a:stretch>
+        </p:blipFill>
+        <p:spPr>
+          <a:xfrm>
+            <a:off x="1647192" y="5826949"/>
+            <a:ext cx="3219450" cy="685800"/>
+          </a:xfrm>
+          <a:prstGeom prst="rect">
+            <a:avLst/>
+          </a:prstGeom>
+        </p:spPr>
+      </p:pic>
+      <p:pic>
+        <p:nvPicPr>
+          <p:cNvPr id="6" name="Gráfico 5">
+            <a:extLst>
+              <a:ext uri="{FF2B5EF4-FFF2-40B4-BE49-F238E27FC236}">
+                <a16:creationId xmlns:a16="http://schemas.microsoft.com/office/drawing/2014/main" id="{6E48658D-3890-6E69-2E42-C24A0A2D8D8E}"/>
+              </a:ext>
+            </a:extLst>
+          </p:cNvPr>
+          <p:cNvPicPr>
+            <a:picLocks noChangeAspect="1"/>
+          </p:cNvPicPr>
+          <p:nvPr userDrawn="1"/>
+        </p:nvPicPr>
+        <p:blipFill>
+          <a:blip r:embed="rId6">
+            <a:extLst>
+              <a:ext uri="{96DAC541-7B7A-43D3-8B79-37D633B846F1}">
+                <asvg:svgBlip xmlns:asvg="http://schemas.microsoft.com/office/drawing/2016/SVG/main" r:embed="rId7"/>
+              </a:ext>
+            </a:extLst>
+          </a:blip>
+          <a:stretch>
+            <a:fillRect/>
+          </a:stretch>
+        </p:blipFill>
+        <p:spPr>
+          <a:xfrm>
+            <a:off x="7185481" y="5545601"/>
+            <a:ext cx="3745491" cy="1248497"/>
+          </a:xfrm>
+          <a:prstGeom prst="rect">
+            <a:avLst/>
+          </a:prstGeom>
+        </p:spPr>
+      </p:pic>
     </p:spTree>
     <p:extLst>
       <p:ext uri="{BB962C8B-B14F-4D97-AF65-F5344CB8AC3E}">
@@ -2109,6 +3257,88 @@
                             </p:childTnLst>
                           </p:cTn>
                         </p:par>
+                        <p:par>
+                          <p:cTn id="9" fill="hold">
+                            <p:stCondLst>
+                              <p:cond delay="500"/>
+                            </p:stCondLst>
+                            <p:childTnLst>
+                              <p:par>
+                                <p:cTn id="10" presetID="2" presetClass="entr" presetSubtype="4" fill="hold" grpId="0" nodeType="afterEffect">
+                                  <p:stCondLst>
+                                    <p:cond delay="0"/>
+                                  </p:stCondLst>
+                                  <p:childTnLst>
+                                    <p:set>
+                                      <p:cBhvr>
+                                        <p:cTn id="11" dur="1" fill="hold">
+                                          <p:stCondLst>
+                                            <p:cond delay="0"/>
+                                          </p:stCondLst>
+                                        </p:cTn>
+                                        <p:tgtEl>
+                                          <p:spTgt spid="4"/>
+                                        </p:tgtEl>
+                                        <p:attrNameLst>
+                                          <p:attrName>style.visibility</p:attrName>
+                                        </p:attrNameLst>
+                                      </p:cBhvr>
+                                      <p:to>
+                                        <p:strVal val="visible"/>
+                                      </p:to>
+                                    </p:set>
+                                    <p:anim calcmode="lin" valueType="num">
+                                      <p:cBhvr additive="base">
+                                        <p:cTn id="12" dur="500" fill="hold"/>
+                                        <p:tgtEl>
+                                          <p:spTgt spid="4"/>
+                                        </p:tgtEl>
+                                        <p:attrNameLst>
+                                          <p:attrName>ppt_x</p:attrName>
+                                        </p:attrNameLst>
+                                      </p:cBhvr>
+                                      <p:tavLst>
+                                        <p:tav tm="0">
+                                          <p:val>
+                                            <p:strVal val="#ppt_x"/>
+                                          </p:val>
+                                        </p:tav>
+                                        <p:tav tm="100000">
+                                          <p:val>
+                                            <p:strVal val="#ppt_x"/>
+                                          </p:val>
+                                        </p:tav>
+                                      </p:tavLst>
+                                    </p:anim>
+                                    <p:anim calcmode="lin" valueType="num">
+                                      <p:cBhvr additive="base">
+                                        <p:cTn id="13" dur="500" fill="hold"/>
+                                        <p:tgtEl>
+                                          <p:spTgt spid="4"/>
+                                        </p:tgtEl>
+                                        <p:attrNameLst>
+                                          <p:attrName>ppt_y</p:attrName>
+                                        </p:attrNameLst>
+                                      </p:cBhvr>
+                                      <p:tavLst>
+                                        <p:tav tm="0">
+                                          <p:val>
+                                            <p:strVal val="1+#ppt_h/2"/>
+                                          </p:val>
+                                        </p:tav>
+                                        <p:tav tm="100000">
+                                          <p:val>
+                                            <p:strVal val="#ppt_y"/>
+                                          </p:val>
+                                        </p:tav>
+                                      </p:tavLst>
+                                    </p:anim>
+                                  </p:childTnLst>
+                                </p:cTn>
+                              </p:par>
+                            </p:childTnLst>
+                          </p:cTn>
+                        </p:par>
                       </p:childTnLst>
                     </p:cTn>
                   </p:par>
@@ -2135,6 +3365,7 @@
     </p:tnLst>
     <p:bldLst>
       <p:bldP spid="3" grpId="0" animBg="1"/>
+      <p:bldP spid="4" grpId="0" animBg="1"/>
     </p:bldLst>
   </p:timing>
   <p:extLst>
@@ -2161,7 +3392,7 @@
 </p:sldLayout>
 </file>
 
-<file path=ppt/slideLayouts/slideLayout6.xml><?xml version="1.0" encoding="utf-8"?>
+<file path=ppt/slideLayouts/slideLayout7.xml><?xml version="1.0" encoding="utf-8"?>
 <p:sldLayout xmlns:a="http://schemas.openxmlformats.org/drawingml/2006/main" xmlns:r="http://schemas.openxmlformats.org/officeDocument/2006/relationships" xmlns:p="http://schemas.openxmlformats.org/presentationml/2006/main" preserve="1" userDrawn="1">
   <p:cSld name="FINAL">
     <p:bg>
@@ -2299,7 +3530,7 @@
           <p:nvPr userDrawn="1"/>
         </p:nvPicPr>
         <p:blipFill>
-          <a:blip r:embed="rId5"/>
+          <a:blip r:embed="rId6"/>
           <a:stretch>
             <a:fillRect/>
           </a:stretch>
@@ -4162,7 +5393,7 @@
           <p:nvPr/>
         </p:nvPicPr>
         <p:blipFill rotWithShape="1">
-          <a:blip r:embed="rId6"/>
+          <a:blip r:embed="rId7"/>
           <a:srcRect l="762"/>
           <a:stretch/>
         </p:blipFill>
@@ -4333,7 +5564,7 @@
           <p:nvPr userDrawn="1"/>
         </p:nvPicPr>
         <p:blipFill>
-          <a:blip r:embed="rId7"/>
+          <a:blip r:embed="rId8"/>
           <a:stretch>
             <a:fillRect/>
           </a:stretch>
@@ -4421,11 +5652,11 @@
             </a:avLst>
           </a:prstGeom>
           <a:blipFill dpi="0" rotWithShape="1">
-            <a:blip r:embed="rId8">
+            <a:blip r:embed="rId9">
               <a:alphaModFix amt="20000"/>
               <a:extLst>
                 <a:ext uri="{96DAC541-7B7A-43D3-8B79-37D633B846F1}">
-                  <asvg:svgBlip xmlns:asvg="http://schemas.microsoft.com/office/drawing/2016/SVG/main" r:embed="rId9"/>
+                  <asvg:svgBlip xmlns:asvg="http://schemas.microsoft.com/office/drawing/2016/SVG/main" r:embed="rId10"/>
                 </a:ext>
               </a:extLst>
             </a:blip>
@@ -4508,6 +5739,7 @@
     <p:sldLayoutId id="2147483896" r:id="rId1"/>
     <p:sldLayoutId id="2147483898" r:id="rId2"/>
     <p:sldLayoutId id="2147483899" r:id="rId3"/>
+    <p:sldLayoutId id="2147483905" r:id="rId4"/>
   </p:sldLayoutIdLst>
   <p:transition>
     <p:fade/>
@@ -7845,6 +9077,78 @@
           </a:p>
         </p:txBody>
       </p:sp>
+      <p:pic>
+        <p:nvPicPr>
+          <p:cNvPr id="3" name="Picture 9">
+            <a:extLst>
+              <a:ext uri="{FF2B5EF4-FFF2-40B4-BE49-F238E27FC236}">
+                <a16:creationId xmlns:a16="http://schemas.microsoft.com/office/drawing/2014/main" id="{7445AFB9-A485-3B7B-C689-CACAF97545C3}"/>
+              </a:ext>
+            </a:extLst>
+          </p:cNvPr>
+          <p:cNvPicPr>
+            <a:picLocks noChangeAspect="1"/>
+          </p:cNvPicPr>
+          <p:nvPr/>
+        </p:nvPicPr>
+        <p:blipFill>
+          <a:blip r:embed="rId3"/>
+          <a:srcRect/>
+          <a:stretch/>
+        </p:blipFill>
+        <p:spPr>
+          <a:xfrm>
+            <a:off x="870685" y="1989282"/>
+            <a:ext cx="1818094" cy="1818094"/>
+          </a:xfrm>
+          <a:prstGeom prst="ellipse">
+            <a:avLst/>
+          </a:prstGeom>
+          <a:effectLst>
+            <a:outerShdw blurRad="63500" dist="63500" dir="2700000" algn="ctr" rotWithShape="0">
+              <a:srgbClr val="000000">
+                <a:alpha val="50000"/>
+              </a:srgbClr>
+            </a:outerShdw>
+          </a:effectLst>
+        </p:spPr>
+      </p:pic>
+      <p:pic>
+        <p:nvPicPr>
+          <p:cNvPr id="8" name="Picture 9">
+            <a:extLst>
+              <a:ext uri="{FF2B5EF4-FFF2-40B4-BE49-F238E27FC236}">
+                <a16:creationId xmlns:a16="http://schemas.microsoft.com/office/drawing/2014/main" id="{FD41DB6D-E525-B441-30EF-BDF2DD531DA0}"/>
+              </a:ext>
+            </a:extLst>
+          </p:cNvPr>
+          <p:cNvPicPr>
+            <a:picLocks noChangeAspect="1"/>
+          </p:cNvPicPr>
+          <p:nvPr/>
+        </p:nvPicPr>
+        <p:blipFill>
+          <a:blip r:embed="rId3"/>
+          <a:srcRect/>
+          <a:stretch/>
+        </p:blipFill>
+        <p:spPr>
+          <a:xfrm>
+            <a:off x="5936097" y="1967031"/>
+            <a:ext cx="1818094" cy="1818094"/>
+          </a:xfrm>
+          <a:prstGeom prst="ellipse">
+            <a:avLst/>
+          </a:prstGeom>
+          <a:effectLst>
+            <a:outerShdw blurRad="63500" dist="63500" dir="2700000" algn="ctr" rotWithShape="0">
+              <a:srgbClr val="000000">
+                <a:alpha val="50000"/>
+              </a:srgbClr>
+            </a:outerShdw>
+          </a:effectLst>
+        </p:spPr>
+      </p:pic>
     </p:spTree>
     <p:extLst>
       <p:ext uri="{BB962C8B-B14F-4D97-AF65-F5344CB8AC3E}">
@@ -8122,6 +9426,120 @@
                                   </p:childTnLst>
                                 </p:cTn>
                               </p:par>
+                              <p:par>
+                                <p:cTn id="26" presetID="10" presetClass="entr" presetSubtype="0" fill="hold" nodeType="withEffect">
+                                  <p:stCondLst>
+                                    <p:cond delay="200"/>
+                                  </p:stCondLst>
+                                  <p:childTnLst>
+                                    <p:set>
+                                      <p:cBhvr>
+                                        <p:cTn id="27" dur="1" fill="hold">
+                                          <p:stCondLst>
+                                            <p:cond delay="0"/>
+                                          </p:stCondLst>
+                                        </p:cTn>
+                                        <p:tgtEl>
+                                          <p:spTgt spid="3"/>
+                                        </p:tgtEl>
+                                        <p:attrNameLst>
+                                          <p:attrName>style.visibility</p:attrName>
+                                        </p:attrNameLst>
+                                      </p:cBhvr>
+                                      <p:to>
+                                        <p:strVal val="visible"/>
+                                      </p:to>
+                                    </p:set>
+                                    <p:animEffect transition="in" filter="fade">
+                                      <p:cBhvr>
+                                        <p:cTn id="28" dur="500"/>
+                                        <p:tgtEl>
+                                          <p:spTgt spid="3"/>
+                                        </p:tgtEl>
+                                      </p:cBhvr>
+                                    </p:animEffect>
+                                  </p:childTnLst>
+                                </p:cTn>
+                              </p:par>
+                              <p:par>
+                                <p:cTn id="29" presetID="42" presetClass="path" presetSubtype="0" decel="100000" fill="hold" nodeType="withEffect">
+                                  <p:stCondLst>
+                                    <p:cond delay="200"/>
+                                  </p:stCondLst>
+                                  <p:childTnLst>
+                                    <p:animMotion origin="layout" path="M -3.33333E-6 1.11111E-6 L -3.33333E-6 0.03542 " pathEditMode="relative" rAng="0" ptsTypes="AA">
+                                      <p:cBhvr>
+                                        <p:cTn id="30" dur="700" spd="-100000" fill="hold"/>
+                                        <p:tgtEl>
+                                          <p:spTgt spid="3"/>
+                                        </p:tgtEl>
+                                        <p:attrNameLst>
+                                          <p:attrName>ppt_x</p:attrName>
+                                          <p:attrName>ppt_y</p:attrName>
+                                        </p:attrNameLst>
+                                      </p:cBhvr>
+                                      <p:rCtr x="0" y="1759"/>
+                                    </p:animMotion>
+                                  </p:childTnLst>
+                                </p:cTn>
+                              </p:par>
+                              <p:par>
+                                <p:cTn id="31" presetID="10" presetClass="entr" presetSubtype="0" fill="hold" nodeType="withEffect">
+                                  <p:stCondLst>
+                                    <p:cond delay="200"/>
+                                  </p:stCondLst>
+                                  <p:childTnLst>
+                                    <p:set>
+                                      <p:cBhvr>
+                                        <p:cTn id="32" dur="1" fill="hold">
+                                          <p:stCondLst>
+                                            <p:cond delay="0"/>
+                                          </p:stCondLst>
+                                        </p:cTn>
+                                        <p:tgtEl>
+                                          <p:spTgt spid="8"/>
+                                        </p:tgtEl>
+                                        <p:attrNameLst>
+                                          <p:attrName>style.visibility</p:attrName>
+                                        </p:attrNameLst>
+                                      </p:cBhvr>
+                                      <p:to>
+                                        <p:strVal val="visible"/>
+                                      </p:to>
+                                    </p:set>
+                                    <p:animEffect transition="in" filter="fade">
+                                      <p:cBhvr>
+                                        <p:cTn id="33" dur="500"/>
+                                        <p:tgtEl>
+                                          <p:spTgt spid="8"/>
+                                        </p:tgtEl>
+                                      </p:cBhvr>
+                                    </p:animEffect>
+                                  </p:childTnLst>
+                                </p:cTn>
+                              </p:par>
+                              <p:par>
+                                <p:cTn id="34" presetID="42" presetClass="path" presetSubtype="0" decel="100000" fill="hold" nodeType="withEffect">
+                                  <p:stCondLst>
+                                    <p:cond delay="200"/>
+                                  </p:stCondLst>
+                                  <p:childTnLst>
+                                    <p:animMotion origin="layout" path="M -3.33333E-6 1.11111E-6 L -3.33333E-6 0.03542 " pathEditMode="relative" rAng="0" ptsTypes="AA">
+                                      <p:cBhvr>
+                                        <p:cTn id="35" dur="700" spd="-100000" fill="hold"/>
+                                        <p:tgtEl>
+                                          <p:spTgt spid="8"/>
+                                        </p:tgtEl>
+                                        <p:attrNameLst>
+                                          <p:attrName>ppt_x</p:attrName>
+                                          <p:attrName>ppt_y</p:attrName>
+                                        </p:attrNameLst>
+                                      </p:cBhvr>
+                                      <p:rCtr x="0" y="1759"/>
+                                    </p:animMotion>
+                                  </p:childTnLst>
+                                </p:cTn>
+                              </p:par>
                             </p:childTnLst>
                           </p:cTn>
                         </p:par>
@@ -8326,42 +9744,6 @@
       </p:sp>
       <p:pic>
         <p:nvPicPr>
-          <p:cNvPr id="10" name="Gráfico 9">
-            <a:extLst>
-              <a:ext uri="{FF2B5EF4-FFF2-40B4-BE49-F238E27FC236}">
-                <a16:creationId xmlns:a16="http://schemas.microsoft.com/office/drawing/2014/main" id="{13B62FA7-B038-93AF-E1D7-A562B2BCAF28}"/>
-              </a:ext>
-            </a:extLst>
-          </p:cNvPr>
-          <p:cNvPicPr>
-            <a:picLocks noChangeAspect="1"/>
-          </p:cNvPicPr>
-          <p:nvPr/>
-        </p:nvPicPr>
-        <p:blipFill>
-          <a:blip r:embed="rId3">
-            <a:extLst>
-              <a:ext uri="{96DAC541-7B7A-43D3-8B79-37D633B846F1}">
-                <asvg:svgBlip xmlns:asvg="http://schemas.microsoft.com/office/drawing/2016/SVG/main" r:embed="rId4"/>
-              </a:ext>
-            </a:extLst>
-          </a:blip>
-          <a:stretch>
-            <a:fillRect/>
-          </a:stretch>
-        </p:blipFill>
-        <p:spPr>
-          <a:xfrm>
-            <a:off x="4486275" y="5583238"/>
-            <a:ext cx="3219450" cy="685800"/>
-          </a:xfrm>
-          <a:prstGeom prst="rect">
-            <a:avLst/>
-          </a:prstGeom>
-        </p:spPr>
-      </p:pic>
-      <p:pic>
-        <p:nvPicPr>
           <p:cNvPr id="12" name="Imagen 11" descr="Texto, Logotipo&#10;&#10;Descripción generada automáticamente">
             <a:extLst>
               <a:ext uri="{FF2B5EF4-FFF2-40B4-BE49-F238E27FC236}">
@@ -8375,14 +9757,14 @@
           <p:nvPr/>
         </p:nvPicPr>
         <p:blipFill>
-          <a:blip r:embed="rId5"/>
+          <a:blip r:embed="rId3"/>
           <a:stretch>
             <a:fillRect/>
           </a:stretch>
         </p:blipFill>
         <p:spPr>
           <a:xfrm>
-            <a:off x="584200" y="2852557"/>
+            <a:off x="809831" y="2090744"/>
             <a:ext cx="5768474" cy="1676056"/>
           </a:xfrm>
           <a:prstGeom prst="rect">
@@ -8405,14 +9787,14 @@
           <p:nvPr/>
         </p:nvPicPr>
         <p:blipFill>
-          <a:blip r:embed="rId6"/>
+          <a:blip r:embed="rId4"/>
           <a:stretch>
             <a:fillRect/>
           </a:stretch>
         </p:blipFill>
         <p:spPr>
           <a:xfrm>
-            <a:off x="941806" y="4588771"/>
+            <a:off x="1464983" y="3826957"/>
             <a:ext cx="4178960" cy="587666"/>
           </a:xfrm>
           <a:prstGeom prst="rect">
@@ -8435,14 +9817,14 @@
           <p:nvPr/>
         </p:nvPicPr>
         <p:blipFill>
-          <a:blip r:embed="rId7"/>
+          <a:blip r:embed="rId5"/>
           <a:stretch>
             <a:fillRect/>
           </a:stretch>
         </p:blipFill>
         <p:spPr>
           <a:xfrm>
-            <a:off x="6656301" y="2985465"/>
+            <a:off x="6881932" y="2223652"/>
             <a:ext cx="4352593" cy="1410240"/>
           </a:xfrm>
           <a:prstGeom prst="rect">
@@ -8465,14 +9847,14 @@
           <p:nvPr/>
         </p:nvPicPr>
         <p:blipFill>
-          <a:blip r:embed="rId8"/>
+          <a:blip r:embed="rId6"/>
           <a:stretch>
             <a:fillRect/>
           </a:stretch>
         </p:blipFill>
         <p:spPr>
           <a:xfrm>
-            <a:off x="7677189" y="4116810"/>
+            <a:off x="7902820" y="3354997"/>
             <a:ext cx="2310815" cy="1531587"/>
           </a:xfrm>
           <a:prstGeom prst="rect">
@@ -8681,7 +10063,7 @@
         <p:cNvPr id="1" name="">
           <a:extLst>
             <a:ext uri="{FF2B5EF4-FFF2-40B4-BE49-F238E27FC236}">
-              <a16:creationId xmlns:a16="http://schemas.microsoft.com/office/drawing/2014/main" id="{F13A1817-F4CF-4D87-5833-EB7C5A9D1FEB}"/>
+              <a16:creationId xmlns:a16="http://schemas.microsoft.com/office/drawing/2014/main" id="{3F15407F-E069-D299-7C92-2F1752ACDC95}"/>
             </a:ext>
           </a:extLst>
         </p:cNvPr>
@@ -8701,7 +10083,7 @@
           <p:cNvPr id="5" name="TextBox 7">
             <a:extLst>
               <a:ext uri="{FF2B5EF4-FFF2-40B4-BE49-F238E27FC236}">
-                <a16:creationId xmlns:a16="http://schemas.microsoft.com/office/drawing/2014/main" id="{24DD02CE-DB61-7E52-6AE2-A2B3F7D27796}"/>
+                <a16:creationId xmlns:a16="http://schemas.microsoft.com/office/drawing/2014/main" id="{90F59E5B-E927-ED3E-C771-DC7F4929F30A}"/>
               </a:ext>
             </a:extLst>
           </p:cNvPr>
@@ -8828,10 +10210,10 @@
       </p:sp>
       <p:pic>
         <p:nvPicPr>
-          <p:cNvPr id="10" name="Gráfico 9">
+          <p:cNvPr id="12" name="Imagen 11" descr="Texto, Logotipo&#10;&#10;Descripción generada automáticamente">
             <a:extLst>
               <a:ext uri="{FF2B5EF4-FFF2-40B4-BE49-F238E27FC236}">
-                <a16:creationId xmlns:a16="http://schemas.microsoft.com/office/drawing/2014/main" id="{C89C0870-CFC1-C19C-1D17-1C8AF2CCF0EA}"/>
+                <a16:creationId xmlns:a16="http://schemas.microsoft.com/office/drawing/2014/main" id="{FFD800D6-24BF-97FC-DB35-A4E8B09B8386}"/>
               </a:ext>
             </a:extLst>
           </p:cNvPr>
@@ -8841,21 +10223,15 @@
           <p:nvPr/>
         </p:nvPicPr>
         <p:blipFill>
-          <a:blip r:embed="rId3">
-            <a:extLst>
-              <a:ext uri="{96DAC541-7B7A-43D3-8B79-37D633B846F1}">
-                <asvg:svgBlip xmlns:asvg="http://schemas.microsoft.com/office/drawing/2016/SVG/main" r:embed="rId4"/>
-              </a:ext>
-            </a:extLst>
-          </a:blip>
+          <a:blip r:embed="rId3"/>
           <a:stretch>
             <a:fillRect/>
           </a:stretch>
         </p:blipFill>
         <p:spPr>
           <a:xfrm>
-            <a:off x="4486275" y="5583238"/>
-            <a:ext cx="3219450" cy="685800"/>
+            <a:off x="809831" y="2090744"/>
+            <a:ext cx="5768474" cy="1676056"/>
           </a:xfrm>
           <a:prstGeom prst="rect">
             <a:avLst/>
@@ -8864,10 +10240,40 @@
       </p:pic>
       <p:pic>
         <p:nvPicPr>
-          <p:cNvPr id="12" name="Imagen 11" descr="Texto, Logotipo&#10;&#10;Descripción generada automáticamente">
+          <p:cNvPr id="14" name="Imagen 13">
             <a:extLst>
               <a:ext uri="{FF2B5EF4-FFF2-40B4-BE49-F238E27FC236}">
-                <a16:creationId xmlns:a16="http://schemas.microsoft.com/office/drawing/2014/main" id="{539239BE-69EC-86AB-0485-A7F89AF3FC20}"/>
+                <a16:creationId xmlns:a16="http://schemas.microsoft.com/office/drawing/2014/main" id="{C71364CB-05AE-22A6-B94E-2599A9992B0B}"/>
+              </a:ext>
+            </a:extLst>
+          </p:cNvPr>
+          <p:cNvPicPr>
+            <a:picLocks noChangeAspect="1"/>
+          </p:cNvPicPr>
+          <p:nvPr/>
+        </p:nvPicPr>
+        <p:blipFill>
+          <a:blip r:embed="rId4"/>
+          <a:stretch>
+            <a:fillRect/>
+          </a:stretch>
+        </p:blipFill>
+        <p:spPr>
+          <a:xfrm>
+            <a:off x="1464983" y="3826957"/>
+            <a:ext cx="4178960" cy="587666"/>
+          </a:xfrm>
+          <a:prstGeom prst="rect">
+            <a:avLst/>
+          </a:prstGeom>
+        </p:spPr>
+      </p:pic>
+      <p:pic>
+        <p:nvPicPr>
+          <p:cNvPr id="21" name="Imagen 20" descr="Logotipo&#10;&#10;Descripción generada automáticamente">
+            <a:extLst>
+              <a:ext uri="{FF2B5EF4-FFF2-40B4-BE49-F238E27FC236}">
+                <a16:creationId xmlns:a16="http://schemas.microsoft.com/office/drawing/2014/main" id="{B7004A28-5C7C-63B8-6148-9AF83FD64401}"/>
               </a:ext>
             </a:extLst>
           </p:cNvPr>
@@ -8884,8 +10290,8 @@
         </p:blipFill>
         <p:spPr>
           <a:xfrm>
-            <a:off x="584200" y="2852557"/>
-            <a:ext cx="5768474" cy="1676056"/>
+            <a:off x="6881932" y="2223652"/>
+            <a:ext cx="4352593" cy="1410240"/>
           </a:xfrm>
           <a:prstGeom prst="rect">
             <a:avLst/>
@@ -8894,10 +10300,10 @@
       </p:pic>
       <p:pic>
         <p:nvPicPr>
-          <p:cNvPr id="14" name="Imagen 13">
+          <p:cNvPr id="3" name="Imagen 2">
             <a:extLst>
               <a:ext uri="{FF2B5EF4-FFF2-40B4-BE49-F238E27FC236}">
-                <a16:creationId xmlns:a16="http://schemas.microsoft.com/office/drawing/2014/main" id="{3B0943FB-5AAD-0524-60CE-5208913262F6}"/>
+                <a16:creationId xmlns:a16="http://schemas.microsoft.com/office/drawing/2014/main" id="{417F94A7-3088-F202-D89C-3F1B5B4AD585}"/>
               </a:ext>
             </a:extLst>
           </p:cNvPr>
@@ -8914,67 +10320,7 @@
         </p:blipFill>
         <p:spPr>
           <a:xfrm>
-            <a:off x="941806" y="4588771"/>
-            <a:ext cx="4178960" cy="587666"/>
-          </a:xfrm>
-          <a:prstGeom prst="rect">
-            <a:avLst/>
-          </a:prstGeom>
-        </p:spPr>
-      </p:pic>
-      <p:pic>
-        <p:nvPicPr>
-          <p:cNvPr id="21" name="Imagen 20" descr="Logotipo&#10;&#10;Descripción generada automáticamente">
-            <a:extLst>
-              <a:ext uri="{FF2B5EF4-FFF2-40B4-BE49-F238E27FC236}">
-                <a16:creationId xmlns:a16="http://schemas.microsoft.com/office/drawing/2014/main" id="{B866EC8E-402F-2511-70DB-7FBED6756059}"/>
-              </a:ext>
-            </a:extLst>
-          </p:cNvPr>
-          <p:cNvPicPr>
-            <a:picLocks noChangeAspect="1"/>
-          </p:cNvPicPr>
-          <p:nvPr/>
-        </p:nvPicPr>
-        <p:blipFill>
-          <a:blip r:embed="rId7"/>
-          <a:stretch>
-            <a:fillRect/>
-          </a:stretch>
-        </p:blipFill>
-        <p:spPr>
-          <a:xfrm>
-            <a:off x="6656301" y="2985465"/>
-            <a:ext cx="4352593" cy="1410240"/>
-          </a:xfrm>
-          <a:prstGeom prst="rect">
-            <a:avLst/>
-          </a:prstGeom>
-        </p:spPr>
-      </p:pic>
-      <p:pic>
-        <p:nvPicPr>
-          <p:cNvPr id="3" name="Imagen 2">
-            <a:extLst>
-              <a:ext uri="{FF2B5EF4-FFF2-40B4-BE49-F238E27FC236}">
-                <a16:creationId xmlns:a16="http://schemas.microsoft.com/office/drawing/2014/main" id="{2F1C1EB9-E220-EC51-F5B4-BDD65F128F8D}"/>
-              </a:ext>
-            </a:extLst>
-          </p:cNvPr>
-          <p:cNvPicPr>
-            <a:picLocks noChangeAspect="1"/>
-          </p:cNvPicPr>
-          <p:nvPr/>
-        </p:nvPicPr>
-        <p:blipFill>
-          <a:blip r:embed="rId8"/>
-          <a:stretch>
-            <a:fillRect/>
-          </a:stretch>
-        </p:blipFill>
-        <p:spPr>
-          <a:xfrm>
-            <a:off x="7677189" y="4116810"/>
+            <a:off x="7902820" y="3354997"/>
             <a:ext cx="2310815" cy="1531587"/>
           </a:xfrm>
           <a:prstGeom prst="rect">
@@ -8985,7 +10331,7 @@
     </p:spTree>
     <p:extLst>
       <p:ext uri="{BB962C8B-B14F-4D97-AF65-F5344CB8AC3E}">
-        <p14:creationId xmlns:p14="http://schemas.microsoft.com/office/powerpoint/2010/main" val="194469974"/>
+        <p14:creationId xmlns:p14="http://schemas.microsoft.com/office/powerpoint/2010/main" val="994247029"/>
       </p:ext>
     </p:extLst>
   </p:cSld>
@@ -9942,6 +11288,15 @@
 </file>
 
 <file path=customXml/item1.xml><?xml version="1.0" encoding="utf-8"?>
+<?mso-contentType ?>
+<FormTemplates xmlns="http://schemas.microsoft.com/sharepoint/v3/contenttype/forms">
+  <Display>DocumentLibraryForm</Display>
+  <Edit>DocumentLibraryForm</Edit>
+  <New>DocumentLibraryForm</New>
+</FormTemplates>
+</file>
+
+<file path=customXml/item2.xml><?xml version="1.0" encoding="utf-8"?>
 <ct:contentTypeSchema xmlns:ct="http://schemas.microsoft.com/office/2006/metadata/contentType" xmlns:ma="http://schemas.microsoft.com/office/2006/metadata/properties/metaAttributes" ct:_="" ma:_="" ma:contentTypeName="Document" ma:contentTypeID="0x01010009C942CAC62E064BA41C16DCE55751F0" ma:contentTypeVersion="17" ma:contentTypeDescription="Create a new document." ma:contentTypeScope="" ma:versionID="ad0002479a0b992217b6a126c3547658">
   <xsd:schema xmlns:xsd="http://www.w3.org/2001/XMLSchema" xmlns:xs="http://www.w3.org/2001/XMLSchema" xmlns:p="http://schemas.microsoft.com/office/2006/metadata/properties" xmlns:ns2="0dde9836-c0c4-4c98-97c4-ed7c1f1380ac" xmlns:ns3="47a810b7-8fb8-429c-8513-1f223c29c0fa" targetNamespace="http://schemas.microsoft.com/office/2006/metadata/properties" ma:root="true" ma:fieldsID="62177a8f626c4c36690efbffc6c6b2e8" ns2:_="" ns3:_="">
     <xsd:import namespace="0dde9836-c0c4-4c98-97c4-ed7c1f1380ac"/>
@@ -10190,16 +11545,15 @@
 </ct:contentTypeSchema>
 </file>
 
-<file path=customXml/item2.xml><?xml version="1.0" encoding="utf-8"?>
-<?mso-contentType ?>
-<FormTemplates xmlns="http://schemas.microsoft.com/sharepoint/v3/contenttype/forms">
-  <Display>DocumentLibraryForm</Display>
-  <Edit>DocumentLibraryForm</Edit>
-  <New>DocumentLibraryForm</New>
-</FormTemplates>
+<file path=customXml/itemProps1.xml><?xml version="1.0" encoding="utf-8"?>
+<ds:datastoreItem xmlns:ds="http://schemas.openxmlformats.org/officeDocument/2006/customXml" ds:itemID="{ACB76787-526F-4840-836B-1E11E1C48F4C}">
+  <ds:schemaRefs>
+    <ds:schemaRef ds:uri="http://schemas.microsoft.com/sharepoint/v3/contenttype/forms"/>
+  </ds:schemaRefs>
+</ds:datastoreItem>
 </file>
 
-<file path=customXml/itemProps1.xml><?xml version="1.0" encoding="utf-8"?>
+<file path=customXml/itemProps2.xml><?xml version="1.0" encoding="utf-8"?>
 <ds:datastoreItem xmlns:ds="http://schemas.openxmlformats.org/officeDocument/2006/customXml" ds:itemID="{D56698FF-69F3-4CE0-8022-EEF4A5E80B81}">
   <ds:schemaRefs>
     <ds:schemaRef ds:uri="http://schemas.microsoft.com/office/2006/metadata/contentType"/>
@@ -10218,14 +11572,6 @@
 </ds:datastoreItem>
 </file>
 
-<file path=customXml/itemProps2.xml><?xml version="1.0" encoding="utf-8"?>
-<ds:datastoreItem xmlns:ds="http://schemas.openxmlformats.org/officeDocument/2006/customXml" ds:itemID="{ACB76787-526F-4840-836B-1E11E1C48F4C}">
-  <ds:schemaRefs>
-    <ds:schemaRef ds:uri="http://schemas.microsoft.com/sharepoint/v3/contenttype/forms"/>
-  </ds:schemaRefs>
-</ds:datastoreItem>
-</file>
-
 <file path=docMetadata/LabelInfo.xml><?xml version="1.0" encoding="utf-8"?>
 <clbl:labelList xmlns:clbl="http://schemas.microsoft.com/office/2020/mipLabelMetadata">
   <clbl:label id="{f42aa342-8706-4288-bd11-ebb85995028c}" enabled="1" method="Standard" siteId="{72f988bf-86f1-41af-91ab-2d7cd011db47}" contentBits="0" removed="0"/>

</xml_diff>